<commit_message>
update syllabus lect and lect and add lect 2
</commit_message>
<xml_diff>
--- a/lectures/00-syllabus.pptx
+++ b/lectures/00-syllabus.pptx
@@ -514,7 +514,7 @@
           <a:p>
             <a:fld id="{241EB5C9-1307-BA42-ABA2-0BC069CD8E7F}" type="datetimeFigureOut">
               <a:rPr lang="en-US" smtClean="0"/>
-              <a:t>1/10/23</a:t>
+              <a:t>1/11/23</a:t>
             </a:fld>
             <a:endParaRPr lang="en-US"/>
           </a:p>
@@ -692,7 +692,7 @@
           <a:p>
             <a:fld id="{241EB5C9-1307-BA42-ABA2-0BC069CD8E7F}" type="datetimeFigureOut">
               <a:rPr lang="en-US" smtClean="0"/>
-              <a:t>1/10/23</a:t>
+              <a:t>1/11/23</a:t>
             </a:fld>
             <a:endParaRPr lang="en-US"/>
           </a:p>
@@ -870,7 +870,7 @@
           <a:p>
             <a:fld id="{241EB5C9-1307-BA42-ABA2-0BC069CD8E7F}" type="datetimeFigureOut">
               <a:rPr lang="en-US" smtClean="0"/>
-              <a:t>1/10/23</a:t>
+              <a:t>1/11/23</a:t>
             </a:fld>
             <a:endParaRPr lang="en-US"/>
           </a:p>
@@ -1129,7 +1129,7 @@
           <a:p>
             <a:fld id="{241EB5C9-1307-BA42-ABA2-0BC069CD8E7F}" type="datetimeFigureOut">
               <a:rPr lang="en-US" smtClean="0"/>
-              <a:t>1/10/23</a:t>
+              <a:t>1/11/23</a:t>
             </a:fld>
             <a:endParaRPr lang="en-US"/>
           </a:p>
@@ -1424,7 +1424,7 @@
           <a:p>
             <a:fld id="{241EB5C9-1307-BA42-ABA2-0BC069CD8E7F}" type="datetimeFigureOut">
               <a:rPr lang="en-US" smtClean="0"/>
-              <a:t>1/10/23</a:t>
+              <a:t>1/11/23</a:t>
             </a:fld>
             <a:endParaRPr lang="en-US"/>
           </a:p>
@@ -1849,7 +1849,7 @@
           <a:p>
             <a:fld id="{241EB5C9-1307-BA42-ABA2-0BC069CD8E7F}" type="datetimeFigureOut">
               <a:rPr lang="en-US" smtClean="0"/>
-              <a:t>1/10/23</a:t>
+              <a:t>1/11/23</a:t>
             </a:fld>
             <a:endParaRPr lang="en-US"/>
           </a:p>
@@ -1976,7 +1976,7 @@
           <a:p>
             <a:fld id="{241EB5C9-1307-BA42-ABA2-0BC069CD8E7F}" type="datetimeFigureOut">
               <a:rPr lang="en-US" smtClean="0"/>
-              <a:t>1/10/23</a:t>
+              <a:t>1/11/23</a:t>
             </a:fld>
             <a:endParaRPr lang="en-US"/>
           </a:p>
@@ -2071,7 +2071,7 @@
           <a:p>
             <a:fld id="{241EB5C9-1307-BA42-ABA2-0BC069CD8E7F}" type="datetimeFigureOut">
               <a:rPr lang="en-US" smtClean="0"/>
-              <a:t>1/10/23</a:t>
+              <a:t>1/11/23</a:t>
             </a:fld>
             <a:endParaRPr lang="en-US"/>
           </a:p>
@@ -2352,7 +2352,7 @@
           <a:p>
             <a:fld id="{241EB5C9-1307-BA42-ABA2-0BC069CD8E7F}" type="datetimeFigureOut">
               <a:rPr lang="en-US" smtClean="0"/>
-              <a:t>1/10/23</a:t>
+              <a:t>1/11/23</a:t>
             </a:fld>
             <a:endParaRPr lang="en-US"/>
           </a:p>
@@ -2604,7 +2604,7 @@
           <a:p>
             <a:fld id="{241EB5C9-1307-BA42-ABA2-0BC069CD8E7F}" type="datetimeFigureOut">
               <a:rPr lang="en-US" smtClean="0"/>
-              <a:t>1/10/23</a:t>
+              <a:t>1/11/23</a:t>
             </a:fld>
             <a:endParaRPr lang="en-US"/>
           </a:p>
@@ -2815,7 +2815,7 @@
           <a:p>
             <a:fld id="{241EB5C9-1307-BA42-ABA2-0BC069CD8E7F}" type="datetimeFigureOut">
               <a:rPr lang="en-US" smtClean="0"/>
-              <a:t>1/10/23</a:t>
+              <a:t>1/11/23</a:t>
             </a:fld>
             <a:endParaRPr lang="en-US"/>
           </a:p>
@@ -3236,7 +3236,9 @@
           </a:xfrm>
         </p:spPr>
         <p:txBody>
-          <a:bodyPr/>
+          <a:bodyPr>
+            <a:normAutofit lnSpcReduction="10000"/>
+          </a:bodyPr>
           <a:lstStyle/>
           <a:p>
             <a:pPr marL="0" lvl="0" indent="0">
@@ -3343,7 +3345,9 @@
         </p:nvSpPr>
         <p:spPr/>
         <p:txBody>
-          <a:bodyPr/>
+          <a:bodyPr>
+            <a:normAutofit lnSpcReduction="10000"/>
+          </a:bodyPr>
           <a:lstStyle/>
           <a:p>
             <a:pPr marL="0" lvl="0" indent="0">
@@ -3453,7 +3457,9 @@
         </p:nvSpPr>
         <p:spPr/>
         <p:txBody>
-          <a:bodyPr/>
+          <a:bodyPr>
+            <a:normAutofit fontScale="85000" lnSpcReduction="10000"/>
+          </a:bodyPr>
           <a:lstStyle/>
           <a:p>
             <a:pPr lvl="0"/>
@@ -3517,7 +3523,9 @@
         </p:nvSpPr>
         <p:spPr/>
         <p:txBody>
-          <a:bodyPr/>
+          <a:bodyPr>
+            <a:normAutofit fontScale="85000" lnSpcReduction="10000"/>
+          </a:bodyPr>
           <a:lstStyle/>
           <a:p>
             <a:pPr lvl="0"/>
@@ -3856,26 +3864,31 @@
         </p:nvSpPr>
         <p:spPr/>
         <p:txBody>
-          <a:bodyPr/>
+          <a:bodyPr>
+            <a:normAutofit fontScale="92500" lnSpcReduction="20000"/>
+          </a:bodyPr>
           <a:lstStyle/>
           <a:p>
             <a:pPr marL="0" lvl="0" indent="0">
               <a:buNone/>
             </a:pPr>
             <a:r>
-              <a:rPr b="1"/>
+              <a:rPr b="1" dirty="0"/>
               <a:t>The course will provide an overview of the development of environmental policy issues and environmental politics in the US.</a:t>
             </a:r>
           </a:p>
           <a:p>
             <a:pPr lvl="0"/>
             <a:r>
+              <a:rPr dirty="0"/>
               <a:t>Provide a theoretical base for understanding environmental politics and policymaking including the process of making environmental policy; the official and unofficial actors and institutions involved; environmental rulemaking; and market-based approaches.</a:t>
             </a:r>
+            <a:endParaRPr lang="en-US" dirty="0"/>
           </a:p>
           <a:p>
             <a:pPr lvl="0"/>
             <a:r>
+              <a:rPr dirty="0"/>
               <a:t>Examine several environmental issues and key policy approaches to address them including air pollution, water pollution, public lands, wetlands, and climate change.</a:t>
             </a:r>
           </a:p>
@@ -4073,7 +4086,9 @@
         </p:nvSpPr>
         <p:spPr/>
         <p:txBody>
-          <a:bodyPr/>
+          <a:bodyPr>
+            <a:normAutofit fontScale="92500" lnSpcReduction="10000"/>
+          </a:bodyPr>
           <a:lstStyle/>
           <a:p>
             <a:pPr lvl="0"/>
@@ -4167,17 +4182,18 @@
           <a:p>
             <a:pPr lvl="0"/>
             <a:r>
-              <a:rPr b="1"/>
+              <a:rPr b="1" dirty="0"/>
               <a:t>Readings</a:t>
             </a:r>
           </a:p>
           <a:p>
             <a:pPr lvl="1"/>
             <a:r>
+              <a:rPr dirty="0"/>
               <a:t>All required readings will be posted on </a:t>
             </a:r>
             <a:r>
-              <a:rPr>
+              <a:rPr dirty="0">
                 <a:hlinkClick r:id="rId2"/>
               </a:rPr>
               <a:t>OAKS</a:t>
@@ -4186,34 +4202,36 @@
           <a:p>
             <a:pPr lvl="1"/>
             <a:r>
+              <a:rPr dirty="0"/>
               <a:t>In general, read half of the readings for Mondays and the other half for Wednesdays</a:t>
             </a:r>
-            <a:br/>
-            <a:endParaRPr/>
           </a:p>
           <a:p>
             <a:pPr lvl="1"/>
             <a:r>
+              <a:rPr dirty="0"/>
               <a:t>We will have in-class quiz questions over the readings</a:t>
             </a:r>
           </a:p>
           <a:p>
             <a:pPr lvl="0"/>
             <a:r>
-              <a:rPr b="1"/>
+              <a:rPr b="1" dirty="0"/>
               <a:t>Poll Everywhere</a:t>
             </a:r>
           </a:p>
           <a:p>
             <a:pPr lvl="1"/>
             <a:r>
+              <a:rPr dirty="0"/>
               <a:t>You will need a device to be able to answer </a:t>
             </a:r>
             <a:r>
-              <a:rPr i="1"/>
+              <a:rPr i="1" dirty="0"/>
               <a:t>Poll Everywhere</a:t>
             </a:r>
             <a:r>
+              <a:rPr dirty="0"/>
               <a:t> questions in class</a:t>
             </a:r>
           </a:p>
@@ -4607,7 +4625,9 @@
         </p:nvSpPr>
         <p:spPr/>
         <p:txBody>
-          <a:bodyPr/>
+          <a:bodyPr>
+            <a:normAutofit fontScale="92500" lnSpcReduction="20000"/>
+          </a:bodyPr>
           <a:lstStyle/>
           <a:p>
             <a:pPr lvl="0"/>
@@ -5273,7 +5293,9 @@
         </p:nvSpPr>
         <p:spPr/>
         <p:txBody>
-          <a:bodyPr/>
+          <a:bodyPr>
+            <a:normAutofit fontScale="92500" lnSpcReduction="10000"/>
+          </a:bodyPr>
           <a:lstStyle/>
           <a:p>
             <a:pPr marL="0" lvl="0" indent="0">

</xml_diff>